<commit_message>
Updated documentation in realisticName()
Signed-off-by: Leo Irakliotis <lgreco@gmail.com>
</commit_message>
<xml_diff>
--- a/Decomposition.pptx
+++ b/Decomposition.pptx
@@ -3668,6 +3668,18 @@
   <p:clrMapOvr>
     <a:masterClrMapping/>
   </p:clrMapOvr>
+  <mc:AlternateContent xmlns:mc="http://schemas.openxmlformats.org/markup-compatibility/2006">
+    <mc:Choice xmlns:p14="http://schemas.microsoft.com/office/powerpoint/2010/main" Requires="p14">
+      <p:transition spd="med" p14:dur="700">
+        <p:fade/>
+      </p:transition>
+    </mc:Choice>
+    <mc:Fallback>
+      <p:transition spd="med">
+        <p:fade/>
+      </p:transition>
+    </mc:Fallback>
+  </mc:AlternateContent>
 </p:sld>
 </file>
 
@@ -4439,6 +4451,18 @@
   <p:clrMapOvr>
     <a:masterClrMapping/>
   </p:clrMapOvr>
+  <mc:AlternateContent xmlns:mc="http://schemas.openxmlformats.org/markup-compatibility/2006">
+    <mc:Choice xmlns:p14="http://schemas.microsoft.com/office/powerpoint/2010/main" Requires="p14">
+      <p:transition spd="med" p14:dur="700">
+        <p:fade/>
+      </p:transition>
+    </mc:Choice>
+    <mc:Fallback>
+      <p:transition spd="med">
+        <p:fade/>
+      </p:transition>
+    </mc:Fallback>
+  </mc:AlternateContent>
 </p:sld>
 </file>
 
@@ -4778,6 +4802,18 @@
   <p:clrMapOvr>
     <a:masterClrMapping/>
   </p:clrMapOvr>
+  <mc:AlternateContent xmlns:mc="http://schemas.openxmlformats.org/markup-compatibility/2006">
+    <mc:Choice xmlns:p14="http://schemas.microsoft.com/office/powerpoint/2010/main" Requires="p14">
+      <p:transition spd="med" p14:dur="700">
+        <p:fade/>
+      </p:transition>
+    </mc:Choice>
+    <mc:Fallback>
+      <p:transition spd="med">
+        <p:fade/>
+      </p:transition>
+    </mc:Fallback>
+  </mc:AlternateContent>
 </p:sld>
 </file>
 
@@ -5161,6 +5197,18 @@
   <p:clrMapOvr>
     <a:masterClrMapping/>
   </p:clrMapOvr>
+  <mc:AlternateContent xmlns:mc="http://schemas.openxmlformats.org/markup-compatibility/2006">
+    <mc:Choice xmlns:p14="http://schemas.microsoft.com/office/powerpoint/2010/main" Requires="p14">
+      <p:transition spd="med" p14:dur="700">
+        <p:fade/>
+      </p:transition>
+    </mc:Choice>
+    <mc:Fallback>
+      <p:transition spd="med">
+        <p:fade/>
+      </p:transition>
+    </mc:Fallback>
+  </mc:AlternateContent>
 </p:sld>
 </file>
 
@@ -6074,6 +6122,18 @@
   <p:clrMapOvr>
     <a:masterClrMapping/>
   </p:clrMapOvr>
+  <mc:AlternateContent xmlns:mc="http://schemas.openxmlformats.org/markup-compatibility/2006">
+    <mc:Choice xmlns:p14="http://schemas.microsoft.com/office/powerpoint/2010/main" Requires="p14">
+      <p:transition spd="med" p14:dur="700">
+        <p:fade/>
+      </p:transition>
+    </mc:Choice>
+    <mc:Fallback>
+      <p:transition spd="med">
+        <p:fade/>
+      </p:transition>
+    </mc:Fallback>
+  </mc:AlternateContent>
 </p:sld>
 </file>
 
@@ -7384,6 +7444,18 @@
   <p:clrMapOvr>
     <a:masterClrMapping/>
   </p:clrMapOvr>
+  <mc:AlternateContent xmlns:mc="http://schemas.openxmlformats.org/markup-compatibility/2006">
+    <mc:Choice xmlns:p14="http://schemas.microsoft.com/office/powerpoint/2010/main" Requires="p14">
+      <p:transition spd="med" p14:dur="700">
+        <p:fade/>
+      </p:transition>
+    </mc:Choice>
+    <mc:Fallback>
+      <p:transition spd="med">
+        <p:fade/>
+      </p:transition>
+    </mc:Fallback>
+  </mc:AlternateContent>
 </p:sld>
 </file>
 
@@ -7906,6 +7978,18 @@
   <p:clrMapOvr>
     <a:masterClrMapping/>
   </p:clrMapOvr>
+  <mc:AlternateContent xmlns:mc="http://schemas.openxmlformats.org/markup-compatibility/2006">
+    <mc:Choice xmlns:p14="http://schemas.microsoft.com/office/powerpoint/2010/main" Requires="p14">
+      <p:transition spd="med" p14:dur="700">
+        <p:fade/>
+      </p:transition>
+    </mc:Choice>
+    <mc:Fallback>
+      <p:transition spd="med">
+        <p:fade/>
+      </p:transition>
+    </mc:Fallback>
+  </mc:AlternateContent>
 </p:sld>
 </file>
 
@@ -8528,6 +8612,18 @@
   <p:clrMapOvr>
     <a:masterClrMapping/>
   </p:clrMapOvr>
+  <mc:AlternateContent xmlns:mc="http://schemas.openxmlformats.org/markup-compatibility/2006">
+    <mc:Choice xmlns:p14="http://schemas.microsoft.com/office/powerpoint/2010/main" Requires="p14">
+      <p:transition spd="med" p14:dur="700">
+        <p:fade/>
+      </p:transition>
+    </mc:Choice>
+    <mc:Fallback>
+      <p:transition spd="med">
+        <p:fade/>
+      </p:transition>
+    </mc:Fallback>
+  </mc:AlternateContent>
 </p:sld>
 </file>
 
@@ -9169,6 +9265,18 @@
   <p:clrMapOvr>
     <a:masterClrMapping/>
   </p:clrMapOvr>
+  <mc:AlternateContent xmlns:mc="http://schemas.openxmlformats.org/markup-compatibility/2006">
+    <mc:Choice xmlns:p14="http://schemas.microsoft.com/office/powerpoint/2010/main" Requires="p14">
+      <p:transition spd="med" p14:dur="700">
+        <p:fade/>
+      </p:transition>
+    </mc:Choice>
+    <mc:Fallback>
+      <p:transition spd="med">
+        <p:fade/>
+      </p:transition>
+    </mc:Fallback>
+  </mc:AlternateContent>
 </p:sld>
 </file>
 
@@ -9862,6 +9970,18 @@
   <p:clrMapOvr>
     <a:masterClrMapping/>
   </p:clrMapOvr>
+  <mc:AlternateContent xmlns:mc="http://schemas.openxmlformats.org/markup-compatibility/2006">
+    <mc:Choice xmlns:p14="http://schemas.microsoft.com/office/powerpoint/2010/main" Requires="p14">
+      <p:transition spd="med" p14:dur="700">
+        <p:fade/>
+      </p:transition>
+    </mc:Choice>
+    <mc:Fallback>
+      <p:transition spd="med">
+        <p:fade/>
+      </p:transition>
+    </mc:Fallback>
+  </mc:AlternateContent>
 </p:sld>
 </file>
 
@@ -10742,6 +10862,18 @@
   <p:clrMapOvr>
     <a:masterClrMapping/>
   </p:clrMapOvr>
+  <mc:AlternateContent xmlns:mc="http://schemas.openxmlformats.org/markup-compatibility/2006">
+    <mc:Choice xmlns:p14="http://schemas.microsoft.com/office/powerpoint/2010/main" Requires="p14">
+      <p:transition spd="med" p14:dur="700">
+        <p:fade/>
+      </p:transition>
+    </mc:Choice>
+    <mc:Fallback>
+      <p:transition spd="med">
+        <p:fade/>
+      </p:transition>
+    </mc:Fallback>
+  </mc:AlternateContent>
 </p:sld>
 </file>
 
@@ -11352,6 +11484,18 @@
   <p:clrMapOvr>
     <a:masterClrMapping/>
   </p:clrMapOvr>
+  <mc:AlternateContent xmlns:mc="http://schemas.openxmlformats.org/markup-compatibility/2006">
+    <mc:Choice xmlns:p14="http://schemas.microsoft.com/office/powerpoint/2010/main" Requires="p14">
+      <p:transition spd="med" p14:dur="700">
+        <p:fade/>
+      </p:transition>
+    </mc:Choice>
+    <mc:Fallback>
+      <p:transition spd="med">
+        <p:fade/>
+      </p:transition>
+    </mc:Fallback>
+  </mc:AlternateContent>
 </p:sld>
 </file>
 
@@ -12319,6 +12463,18 @@
   <p:clrMapOvr>
     <a:masterClrMapping/>
   </p:clrMapOvr>
+  <mc:AlternateContent xmlns:mc="http://schemas.openxmlformats.org/markup-compatibility/2006">
+    <mc:Choice xmlns:p14="http://schemas.microsoft.com/office/powerpoint/2010/main" Requires="p14">
+      <p:transition spd="med" p14:dur="700">
+        <p:fade/>
+      </p:transition>
+    </mc:Choice>
+    <mc:Fallback>
+      <p:transition spd="med">
+        <p:fade/>
+      </p:transition>
+    </mc:Fallback>
+  </mc:AlternateContent>
 </p:sld>
 </file>
 
@@ -13286,6 +13442,18 @@
   <p:clrMapOvr>
     <a:masterClrMapping/>
   </p:clrMapOvr>
+  <mc:AlternateContent xmlns:mc="http://schemas.openxmlformats.org/markup-compatibility/2006">
+    <mc:Choice xmlns:p14="http://schemas.microsoft.com/office/powerpoint/2010/main" Requires="p14">
+      <p:transition spd="med" p14:dur="700">
+        <p:fade/>
+      </p:transition>
+    </mc:Choice>
+    <mc:Fallback>
+      <p:transition spd="med">
+        <p:fade/>
+      </p:transition>
+    </mc:Fallback>
+  </mc:AlternateContent>
 </p:sld>
 </file>
 
@@ -14533,6 +14701,18 @@
   <p:clrMapOvr>
     <a:masterClrMapping/>
   </p:clrMapOvr>
+  <mc:AlternateContent xmlns:mc="http://schemas.openxmlformats.org/markup-compatibility/2006">
+    <mc:Choice xmlns:p14="http://schemas.microsoft.com/office/powerpoint/2010/main" Requires="p14">
+      <p:transition spd="med" p14:dur="700">
+        <p:fade/>
+      </p:transition>
+    </mc:Choice>
+    <mc:Fallback>
+      <p:transition spd="med">
+        <p:fade/>
+      </p:transition>
+    </mc:Fallback>
+  </mc:AlternateContent>
 </p:sld>
 </file>
 
@@ -15745,6 +15925,18 @@
   <p:clrMapOvr>
     <a:masterClrMapping/>
   </p:clrMapOvr>
+  <mc:AlternateContent xmlns:mc="http://schemas.openxmlformats.org/markup-compatibility/2006">
+    <mc:Choice xmlns:p14="http://schemas.microsoft.com/office/powerpoint/2010/main" Requires="p14">
+      <p:transition spd="med" p14:dur="700">
+        <p:fade/>
+      </p:transition>
+    </mc:Choice>
+    <mc:Fallback>
+      <p:transition spd="med">
+        <p:fade/>
+      </p:transition>
+    </mc:Fallback>
+  </mc:AlternateContent>
 </p:sld>
 </file>
 
@@ -16474,6 +16666,18 @@
   <p:clrMapOvr>
     <a:masterClrMapping/>
   </p:clrMapOvr>
+  <mc:AlternateContent xmlns:mc="http://schemas.openxmlformats.org/markup-compatibility/2006">
+    <mc:Choice xmlns:p14="http://schemas.microsoft.com/office/powerpoint/2010/main" Requires="p14">
+      <p:transition spd="med" p14:dur="700">
+        <p:fade/>
+      </p:transition>
+    </mc:Choice>
+    <mc:Fallback>
+      <p:transition spd="med">
+        <p:fade/>
+      </p:transition>
+    </mc:Fallback>
+  </mc:AlternateContent>
 </p:sld>
 </file>
 
@@ -17699,6 +17903,18 @@
   <p:clrMapOvr>
     <a:masterClrMapping/>
   </p:clrMapOvr>
+  <mc:AlternateContent xmlns:mc="http://schemas.openxmlformats.org/markup-compatibility/2006">
+    <mc:Choice xmlns:p14="http://schemas.microsoft.com/office/powerpoint/2010/main" Requires="p14">
+      <p:transition spd="med" p14:dur="700">
+        <p:fade/>
+      </p:transition>
+    </mc:Choice>
+    <mc:Fallback>
+      <p:transition spd="med">
+        <p:fade/>
+      </p:transition>
+    </mc:Fallback>
+  </mc:AlternateContent>
 </p:sld>
 </file>
 
@@ -18449,6 +18665,18 @@
   <p:clrMapOvr>
     <a:masterClrMapping/>
   </p:clrMapOvr>
+  <mc:AlternateContent xmlns:mc="http://schemas.openxmlformats.org/markup-compatibility/2006">
+    <mc:Choice xmlns:p14="http://schemas.microsoft.com/office/powerpoint/2010/main" Requires="p14">
+      <p:transition spd="med" p14:dur="700">
+        <p:fade/>
+      </p:transition>
+    </mc:Choice>
+    <mc:Fallback>
+      <p:transition spd="med">
+        <p:fade/>
+      </p:transition>
+    </mc:Fallback>
+  </mc:AlternateContent>
 </p:sld>
 </file>
 
@@ -19398,6 +19626,18 @@
   <p:clrMapOvr>
     <a:masterClrMapping/>
   </p:clrMapOvr>
+  <mc:AlternateContent xmlns:mc="http://schemas.openxmlformats.org/markup-compatibility/2006">
+    <mc:Choice xmlns:p14="http://schemas.microsoft.com/office/powerpoint/2010/main" Requires="p14">
+      <p:transition spd="med" p14:dur="700">
+        <p:fade/>
+      </p:transition>
+    </mc:Choice>
+    <mc:Fallback>
+      <p:transition spd="med">
+        <p:fade/>
+      </p:transition>
+    </mc:Fallback>
+  </mc:AlternateContent>
 </p:sld>
 </file>
 
@@ -20659,6 +20899,18 @@
   <p:clrMapOvr>
     <a:masterClrMapping/>
   </p:clrMapOvr>
+  <mc:AlternateContent xmlns:mc="http://schemas.openxmlformats.org/markup-compatibility/2006">
+    <mc:Choice xmlns:p14="http://schemas.microsoft.com/office/powerpoint/2010/main" Requires="p14">
+      <p:transition spd="med" p14:dur="700">
+        <p:fade/>
+      </p:transition>
+    </mc:Choice>
+    <mc:Fallback>
+      <p:transition spd="med">
+        <p:fade/>
+      </p:transition>
+    </mc:Fallback>
+  </mc:AlternateContent>
 </p:sld>
 </file>
 
@@ -21212,6 +21464,18 @@
   <p:clrMapOvr>
     <a:masterClrMapping/>
   </p:clrMapOvr>
+  <mc:AlternateContent xmlns:mc="http://schemas.openxmlformats.org/markup-compatibility/2006">
+    <mc:Choice xmlns:p14="http://schemas.microsoft.com/office/powerpoint/2010/main" Requires="p14">
+      <p:transition spd="med" p14:dur="700">
+        <p:fade/>
+      </p:transition>
+    </mc:Choice>
+    <mc:Fallback>
+      <p:transition spd="med">
+        <p:fade/>
+      </p:transition>
+    </mc:Fallback>
+  </mc:AlternateContent>
 </p:sld>
 </file>
 
@@ -21765,6 +22029,18 @@
   <p:clrMapOvr>
     <a:masterClrMapping/>
   </p:clrMapOvr>
+  <mc:AlternateContent xmlns:mc="http://schemas.openxmlformats.org/markup-compatibility/2006">
+    <mc:Choice xmlns:p14="http://schemas.microsoft.com/office/powerpoint/2010/main" Requires="p14">
+      <p:transition spd="med" p14:dur="700">
+        <p:fade/>
+      </p:transition>
+    </mc:Choice>
+    <mc:Fallback>
+      <p:transition spd="med">
+        <p:fade/>
+      </p:transition>
+    </mc:Fallback>
+  </mc:AlternateContent>
 </p:sld>
 </file>
 

</xml_diff>